<commit_message>
Change subtitle; ignore temp files
</commit_message>
<xml_diff>
--- a/Presentation--Upgrading-to-CMS-12-and-Commerce-14.pptx
+++ b/Presentation--Upgrading-to-CMS-12-and-Commerce-14.pptx
@@ -5272,8 +5272,12 @@
           </a:p>
           <a:p>
             <a:r>
+              <a:rPr lang="en-US"/>
+              <a:t>And </a:t>
+            </a:r>
+            <a:r>
               <a:rPr lang="en-US" dirty="0"/>
-              <a:t>Pitfalls to Avoid</a:t>
+              <a:t>avoiding pitfalls while doing it</a:t>
             </a:r>
             <a:br>
               <a:rPr lang="en-US" dirty="0"/>
@@ -7148,8 +7152,8 @@
           <a:p>
             <a:pPr algn="l"/>
             <a:r>
-              <a:rPr lang="en-US" b="1" dirty="0"/>
-              <a:t>Pitfalls to Avoid</a:t>
+              <a:rPr lang="en-US" dirty="0"/>
+              <a:t>And avoiding pitfalls while doing it</a:t>
             </a:r>
           </a:p>
           <a:p>

</xml_diff>